<commit_message>
Added flowchart to ppt
</commit_message>
<xml_diff>
--- a/presentation/Face Detection on the GPU.pptx
+++ b/presentation/Face Detection on the GPU.pptx
@@ -296,7 +296,8 @@
           <a:p>
             <a:fld id="{DE877FA8-6401-44AA-A199-0446E9745075}" type="datetimeFigureOut">
               <a:rPr lang="en-US" smtClean="0"/>
-              <a:t>3/13/2012</a:t>
+              <a:pPr/>
+              <a:t>3/14/2012</a:t>
             </a:fld>
             <a:endParaRPr lang="en-US"/>
           </a:p>
@@ -338,6 +339,7 @@
           <a:p>
             <a:fld id="{5F576237-7925-4578-81FE-7737AE0013B4}" type="slidenum">
               <a:rPr lang="en-US" smtClean="0"/>
+              <a:pPr/>
               <a:t>‹#›</a:t>
             </a:fld>
             <a:endParaRPr lang="en-US"/>
@@ -461,7 +463,8 @@
           <a:p>
             <a:fld id="{DE877FA8-6401-44AA-A199-0446E9745075}" type="datetimeFigureOut">
               <a:rPr lang="en-US" smtClean="0"/>
-              <a:t>3/13/2012</a:t>
+              <a:pPr/>
+              <a:t>3/14/2012</a:t>
             </a:fld>
             <a:endParaRPr lang="en-US"/>
           </a:p>
@@ -503,6 +506,7 @@
           <a:p>
             <a:fld id="{5F576237-7925-4578-81FE-7737AE0013B4}" type="slidenum">
               <a:rPr lang="en-US" smtClean="0"/>
+              <a:pPr/>
               <a:t>‹#›</a:t>
             </a:fld>
             <a:endParaRPr lang="en-US"/>
@@ -636,7 +640,8 @@
           <a:p>
             <a:fld id="{DE877FA8-6401-44AA-A199-0446E9745075}" type="datetimeFigureOut">
               <a:rPr lang="en-US" smtClean="0"/>
-              <a:t>3/13/2012</a:t>
+              <a:pPr/>
+              <a:t>3/14/2012</a:t>
             </a:fld>
             <a:endParaRPr lang="en-US"/>
           </a:p>
@@ -678,6 +683,7 @@
           <a:p>
             <a:fld id="{5F576237-7925-4578-81FE-7737AE0013B4}" type="slidenum">
               <a:rPr lang="en-US" smtClean="0"/>
+              <a:pPr/>
               <a:t>‹#›</a:t>
             </a:fld>
             <a:endParaRPr lang="en-US"/>
@@ -801,7 +807,8 @@
           <a:p>
             <a:fld id="{DE877FA8-6401-44AA-A199-0446E9745075}" type="datetimeFigureOut">
               <a:rPr lang="en-US" smtClean="0"/>
-              <a:t>3/13/2012</a:t>
+              <a:pPr/>
+              <a:t>3/14/2012</a:t>
             </a:fld>
             <a:endParaRPr lang="en-US"/>
           </a:p>
@@ -843,6 +850,7 @@
           <a:p>
             <a:fld id="{5F576237-7925-4578-81FE-7737AE0013B4}" type="slidenum">
               <a:rPr lang="en-US" smtClean="0"/>
+              <a:pPr/>
               <a:t>‹#›</a:t>
             </a:fld>
             <a:endParaRPr lang="en-US"/>
@@ -1042,7 +1050,8 @@
           <a:p>
             <a:fld id="{DE877FA8-6401-44AA-A199-0446E9745075}" type="datetimeFigureOut">
               <a:rPr lang="en-US" smtClean="0"/>
-              <a:t>3/13/2012</a:t>
+              <a:pPr/>
+              <a:t>3/14/2012</a:t>
             </a:fld>
             <a:endParaRPr lang="en-US"/>
           </a:p>
@@ -1084,6 +1093,7 @@
           <a:p>
             <a:fld id="{5F576237-7925-4578-81FE-7737AE0013B4}" type="slidenum">
               <a:rPr lang="en-US" smtClean="0"/>
+              <a:pPr/>
               <a:t>‹#›</a:t>
             </a:fld>
             <a:endParaRPr lang="en-US"/>
@@ -1325,7 +1335,8 @@
           <a:p>
             <a:fld id="{DE877FA8-6401-44AA-A199-0446E9745075}" type="datetimeFigureOut">
               <a:rPr lang="en-US" smtClean="0"/>
-              <a:t>3/13/2012</a:t>
+              <a:pPr/>
+              <a:t>3/14/2012</a:t>
             </a:fld>
             <a:endParaRPr lang="en-US"/>
           </a:p>
@@ -1367,6 +1378,7 @@
           <a:p>
             <a:fld id="{5F576237-7925-4578-81FE-7737AE0013B4}" type="slidenum">
               <a:rPr lang="en-US" smtClean="0"/>
+              <a:pPr/>
               <a:t>‹#›</a:t>
             </a:fld>
             <a:endParaRPr lang="en-US"/>
@@ -1742,7 +1754,8 @@
           <a:p>
             <a:fld id="{DE877FA8-6401-44AA-A199-0446E9745075}" type="datetimeFigureOut">
               <a:rPr lang="en-US" smtClean="0"/>
-              <a:t>3/13/2012</a:t>
+              <a:pPr/>
+              <a:t>3/14/2012</a:t>
             </a:fld>
             <a:endParaRPr lang="en-US"/>
           </a:p>
@@ -1784,6 +1797,7 @@
           <a:p>
             <a:fld id="{5F576237-7925-4578-81FE-7737AE0013B4}" type="slidenum">
               <a:rPr lang="en-US" smtClean="0"/>
+              <a:pPr/>
               <a:t>‹#›</a:t>
             </a:fld>
             <a:endParaRPr lang="en-US"/>
@@ -1855,7 +1869,8 @@
           <a:p>
             <a:fld id="{DE877FA8-6401-44AA-A199-0446E9745075}" type="datetimeFigureOut">
               <a:rPr lang="en-US" smtClean="0"/>
-              <a:t>3/13/2012</a:t>
+              <a:pPr/>
+              <a:t>3/14/2012</a:t>
             </a:fld>
             <a:endParaRPr lang="en-US"/>
           </a:p>
@@ -1897,6 +1912,7 @@
           <a:p>
             <a:fld id="{5F576237-7925-4578-81FE-7737AE0013B4}" type="slidenum">
               <a:rPr lang="en-US" smtClean="0"/>
+              <a:pPr/>
               <a:t>‹#›</a:t>
             </a:fld>
             <a:endParaRPr lang="en-US"/>
@@ -1945,7 +1961,8 @@
           <a:p>
             <a:fld id="{DE877FA8-6401-44AA-A199-0446E9745075}" type="datetimeFigureOut">
               <a:rPr lang="en-US" smtClean="0"/>
-              <a:t>3/13/2012</a:t>
+              <a:pPr/>
+              <a:t>3/14/2012</a:t>
             </a:fld>
             <a:endParaRPr lang="en-US"/>
           </a:p>
@@ -1987,6 +2004,7 @@
           <a:p>
             <a:fld id="{5F576237-7925-4578-81FE-7737AE0013B4}" type="slidenum">
               <a:rPr lang="en-US" smtClean="0"/>
+              <a:pPr/>
               <a:t>‹#›</a:t>
             </a:fld>
             <a:endParaRPr lang="en-US"/>
@@ -2217,7 +2235,8 @@
           <a:p>
             <a:fld id="{DE877FA8-6401-44AA-A199-0446E9745075}" type="datetimeFigureOut">
               <a:rPr lang="en-US" smtClean="0"/>
-              <a:t>3/13/2012</a:t>
+              <a:pPr/>
+              <a:t>3/14/2012</a:t>
             </a:fld>
             <a:endParaRPr lang="en-US"/>
           </a:p>
@@ -2259,6 +2278,7 @@
           <a:p>
             <a:fld id="{5F576237-7925-4578-81FE-7737AE0013B4}" type="slidenum">
               <a:rPr lang="en-US" smtClean="0"/>
+              <a:pPr/>
               <a:t>‹#›</a:t>
             </a:fld>
             <a:endParaRPr lang="en-US"/>
@@ -2465,7 +2485,8 @@
           <a:p>
             <a:fld id="{DE877FA8-6401-44AA-A199-0446E9745075}" type="datetimeFigureOut">
               <a:rPr lang="en-US" smtClean="0"/>
-              <a:t>3/13/2012</a:t>
+              <a:pPr/>
+              <a:t>3/14/2012</a:t>
             </a:fld>
             <a:endParaRPr lang="en-US"/>
           </a:p>
@@ -2507,6 +2528,7 @@
           <a:p>
             <a:fld id="{5F576237-7925-4578-81FE-7737AE0013B4}" type="slidenum">
               <a:rPr lang="en-US" smtClean="0"/>
+              <a:pPr/>
               <a:t>‹#›</a:t>
             </a:fld>
             <a:endParaRPr lang="en-US"/>
@@ -2673,7 +2695,8 @@
           <a:p>
             <a:fld id="{DE877FA8-6401-44AA-A199-0446E9745075}" type="datetimeFigureOut">
               <a:rPr lang="en-US" smtClean="0"/>
-              <a:t>3/13/2012</a:t>
+              <a:pPr/>
+              <a:t>3/14/2012</a:t>
             </a:fld>
             <a:endParaRPr lang="en-US"/>
           </a:p>
@@ -2751,6 +2774,7 @@
           <a:p>
             <a:fld id="{5F576237-7925-4578-81FE-7737AE0013B4}" type="slidenum">
               <a:rPr lang="en-US" smtClean="0"/>
+              <a:pPr/>
               <a:t>‹#›</a:t>
             </a:fld>
             <a:endParaRPr lang="en-US"/>
@@ -3161,7 +3185,11 @@
             </a:pPr>
             <a:r>
               <a:rPr lang="en-US" dirty="0" smtClean="0"/>
-              <a:t>Idea: Use simple rectangular classifiers to rule out things that aren’t faces until you end up with only things that are faces.</a:t>
+              <a:t>Idea: Use simple rectangular classifiers to rule out things that aren’t faces until you end up with only things that are </a:t>
+            </a:r>
+            <a:r>
+              <a:rPr lang="en-US" dirty="0" smtClean="0"/>
+              <a:t>faces.</a:t>
             </a:r>
             <a:endParaRPr lang="en-US" dirty="0"/>
           </a:p>
@@ -3484,16 +3512,605 @@
             </a:pPr>
             <a:r>
               <a:rPr lang="en-US" dirty="0" smtClean="0"/>
-              <a:t>(insert flow </a:t>
-            </a:r>
-            <a:r>
-              <a:rPr lang="en-US" smtClean="0"/>
-              <a:t>chart image)</a:t>
+              <a:t>(insert flow chart image)</a:t>
             </a:r>
             <a:endParaRPr lang="en-US" dirty="0"/>
           </a:p>
         </p:txBody>
       </p:sp>
+      <p:grpSp>
+        <p:nvGrpSpPr>
+          <p:cNvPr id="6" name="Group 5"/>
+          <p:cNvGrpSpPr/>
+          <p:nvPr/>
+        </p:nvGrpSpPr>
+        <p:grpSpPr>
+          <a:xfrm>
+            <a:off x="533400" y="4114800"/>
+            <a:ext cx="2438400" cy="990600"/>
+            <a:chOff x="685800" y="4114800"/>
+            <a:chExt cx="2438400" cy="990600"/>
+          </a:xfrm>
+        </p:grpSpPr>
+        <p:sp>
+          <p:nvSpPr>
+            <p:cNvPr id="4" name="Oval 3"/>
+            <p:cNvSpPr/>
+            <p:nvPr/>
+          </p:nvSpPr>
+          <p:spPr>
+            <a:xfrm>
+              <a:off x="685800" y="4114800"/>
+              <a:ext cx="2438400" cy="990600"/>
+            </a:xfrm>
+            <a:prstGeom prst="ellipse">
+              <a:avLst/>
+            </a:prstGeom>
+            <a:ln>
+              <a:solidFill>
+                <a:schemeClr val="tx1"/>
+              </a:solidFill>
+            </a:ln>
+          </p:spPr>
+          <p:style>
+            <a:lnRef idx="2">
+              <a:schemeClr val="accent6"/>
+            </a:lnRef>
+            <a:fillRef idx="1">
+              <a:schemeClr val="lt1"/>
+            </a:fillRef>
+            <a:effectRef idx="0">
+              <a:schemeClr val="accent6"/>
+            </a:effectRef>
+            <a:fontRef idx="minor">
+              <a:schemeClr val="dk1"/>
+            </a:fontRef>
+          </p:style>
+          <p:txBody>
+            <a:bodyPr rtlCol="0" anchor="ctr"/>
+            <a:lstStyle/>
+            <a:p>
+              <a:pPr algn="ctr"/>
+              <a:endParaRPr lang="en-US"/>
+            </a:p>
+          </p:txBody>
+        </p:sp>
+        <p:sp>
+          <p:nvSpPr>
+            <p:cNvPr id="5" name="TextBox 4"/>
+            <p:cNvSpPr txBox="1"/>
+            <p:nvPr/>
+          </p:nvSpPr>
+          <p:spPr>
+            <a:xfrm>
+              <a:off x="1219200" y="4419600"/>
+              <a:ext cx="1676400" cy="381000"/>
+            </a:xfrm>
+            <a:prstGeom prst="rect">
+              <a:avLst/>
+            </a:prstGeom>
+            <a:noFill/>
+          </p:spPr>
+          <p:txBody>
+            <a:bodyPr wrap="square" rtlCol="0">
+              <a:spAutoFit/>
+            </a:bodyPr>
+            <a:lstStyle/>
+            <a:p>
+              <a:r>
+                <a:rPr lang="en-US" dirty="0" smtClean="0"/>
+                <a:t>Sub-windows</a:t>
+              </a:r>
+              <a:endParaRPr lang="en-US" dirty="0"/>
+            </a:p>
+          </p:txBody>
+        </p:sp>
+      </p:grpSp>
+      <p:sp>
+        <p:nvSpPr>
+          <p:cNvPr id="7" name="Rectangle 6"/>
+          <p:cNvSpPr/>
+          <p:nvPr/>
+        </p:nvSpPr>
+        <p:spPr>
+          <a:xfrm>
+            <a:off x="3429000" y="4114800"/>
+            <a:ext cx="1711036" cy="990600"/>
+          </a:xfrm>
+          <a:prstGeom prst="rect">
+            <a:avLst/>
+          </a:prstGeom>
+          <a:ln>
+            <a:solidFill>
+              <a:schemeClr val="tx1"/>
+            </a:solidFill>
+          </a:ln>
+        </p:spPr>
+        <p:style>
+          <a:lnRef idx="2">
+            <a:schemeClr val="accent6"/>
+          </a:lnRef>
+          <a:fillRef idx="1">
+            <a:schemeClr val="lt1"/>
+          </a:fillRef>
+          <a:effectRef idx="0">
+            <a:schemeClr val="accent6"/>
+          </a:effectRef>
+          <a:fontRef idx="minor">
+            <a:schemeClr val="dk1"/>
+          </a:fontRef>
+        </p:style>
+        <p:txBody>
+          <a:bodyPr rtlCol="0" anchor="ctr"/>
+          <a:lstStyle/>
+          <a:p>
+            <a:pPr algn="ctr"/>
+            <a:endParaRPr lang="en-US"/>
+          </a:p>
+        </p:txBody>
+      </p:sp>
+      <p:sp>
+        <p:nvSpPr>
+          <p:cNvPr id="8" name="Rectangle 7"/>
+          <p:cNvSpPr/>
+          <p:nvPr/>
+        </p:nvSpPr>
+        <p:spPr>
+          <a:xfrm>
+            <a:off x="6019800" y="4114800"/>
+            <a:ext cx="1711036" cy="990600"/>
+          </a:xfrm>
+          <a:prstGeom prst="rect">
+            <a:avLst/>
+          </a:prstGeom>
+          <a:ln>
+            <a:solidFill>
+              <a:schemeClr val="tx1"/>
+            </a:solidFill>
+          </a:ln>
+        </p:spPr>
+        <p:style>
+          <a:lnRef idx="2">
+            <a:schemeClr val="accent6"/>
+          </a:lnRef>
+          <a:fillRef idx="1">
+            <a:schemeClr val="lt1"/>
+          </a:fillRef>
+          <a:effectRef idx="0">
+            <a:schemeClr val="accent6"/>
+          </a:effectRef>
+          <a:fontRef idx="minor">
+            <a:schemeClr val="dk1"/>
+          </a:fontRef>
+        </p:style>
+        <p:txBody>
+          <a:bodyPr rtlCol="0" anchor="ctr"/>
+          <a:lstStyle/>
+          <a:p>
+            <a:pPr algn="ctr"/>
+            <a:endParaRPr lang="en-US"/>
+          </a:p>
+        </p:txBody>
+      </p:sp>
+      <p:sp>
+        <p:nvSpPr>
+          <p:cNvPr id="9" name="TextBox 8"/>
+          <p:cNvSpPr txBox="1"/>
+          <p:nvPr/>
+        </p:nvSpPr>
+        <p:spPr>
+          <a:xfrm>
+            <a:off x="3657600" y="4431268"/>
+            <a:ext cx="1371600" cy="369332"/>
+          </a:xfrm>
+          <a:prstGeom prst="rect">
+            <a:avLst/>
+          </a:prstGeom>
+          <a:noFill/>
+        </p:spPr>
+        <p:txBody>
+          <a:bodyPr wrap="square" rtlCol="0">
+            <a:spAutoFit/>
+          </a:bodyPr>
+          <a:lstStyle/>
+          <a:p>
+            <a:r>
+              <a:rPr lang="en-US" dirty="0" smtClean="0"/>
+              <a:t>Classifier 1</a:t>
+            </a:r>
+            <a:endParaRPr lang="en-US" dirty="0"/>
+          </a:p>
+        </p:txBody>
+      </p:sp>
+      <p:sp>
+        <p:nvSpPr>
+          <p:cNvPr id="10" name="TextBox 9"/>
+          <p:cNvSpPr txBox="1"/>
+          <p:nvPr/>
+        </p:nvSpPr>
+        <p:spPr>
+          <a:xfrm>
+            <a:off x="6248400" y="4419600"/>
+            <a:ext cx="1371600" cy="369332"/>
+          </a:xfrm>
+          <a:prstGeom prst="rect">
+            <a:avLst/>
+          </a:prstGeom>
+          <a:noFill/>
+        </p:spPr>
+        <p:txBody>
+          <a:bodyPr wrap="square" rtlCol="0">
+            <a:spAutoFit/>
+          </a:bodyPr>
+          <a:lstStyle/>
+          <a:p>
+            <a:r>
+              <a:rPr lang="en-US" dirty="0" smtClean="0"/>
+              <a:t>Classifier 2</a:t>
+            </a:r>
+            <a:endParaRPr lang="en-US" dirty="0"/>
+          </a:p>
+        </p:txBody>
+      </p:sp>
+      <p:cxnSp>
+        <p:nvCxnSpPr>
+          <p:cNvPr id="12" name="Straight Arrow Connector 11"/>
+          <p:cNvCxnSpPr>
+            <a:stCxn id="4" idx="6"/>
+            <a:endCxn id="7" idx="1"/>
+          </p:cNvCxnSpPr>
+          <p:nvPr/>
+        </p:nvCxnSpPr>
+        <p:spPr>
+          <a:xfrm>
+            <a:off x="2971800" y="4610100"/>
+            <a:ext cx="457200" cy="0"/>
+          </a:xfrm>
+          <a:prstGeom prst="straightConnector1">
+            <a:avLst/>
+          </a:prstGeom>
+          <a:ln w="38100">
+            <a:tailEnd type="arrow"/>
+          </a:ln>
+        </p:spPr>
+        <p:style>
+          <a:lnRef idx="1">
+            <a:schemeClr val="dk1"/>
+          </a:lnRef>
+          <a:fillRef idx="0">
+            <a:schemeClr val="dk1"/>
+          </a:fillRef>
+          <a:effectRef idx="0">
+            <a:schemeClr val="dk1"/>
+          </a:effectRef>
+          <a:fontRef idx="minor">
+            <a:schemeClr val="tx1"/>
+          </a:fontRef>
+        </p:style>
+      </p:cxnSp>
+      <p:cxnSp>
+        <p:nvCxnSpPr>
+          <p:cNvPr id="13" name="Straight Arrow Connector 12"/>
+          <p:cNvCxnSpPr>
+            <a:stCxn id="7" idx="3"/>
+            <a:endCxn id="8" idx="1"/>
+          </p:cNvCxnSpPr>
+          <p:nvPr/>
+        </p:nvCxnSpPr>
+        <p:spPr>
+          <a:xfrm>
+            <a:off x="5140036" y="4610100"/>
+            <a:ext cx="879764" cy="0"/>
+          </a:xfrm>
+          <a:prstGeom prst="straightConnector1">
+            <a:avLst/>
+          </a:prstGeom>
+          <a:ln w="38100">
+            <a:tailEnd type="arrow"/>
+          </a:ln>
+        </p:spPr>
+        <p:style>
+          <a:lnRef idx="1">
+            <a:schemeClr val="dk1"/>
+          </a:lnRef>
+          <a:fillRef idx="0">
+            <a:schemeClr val="dk1"/>
+          </a:fillRef>
+          <a:effectRef idx="0">
+            <a:schemeClr val="dk1"/>
+          </a:effectRef>
+          <a:fontRef idx="minor">
+            <a:schemeClr val="tx1"/>
+          </a:fontRef>
+        </p:style>
+      </p:cxnSp>
+      <p:cxnSp>
+        <p:nvCxnSpPr>
+          <p:cNvPr id="16" name="Straight Arrow Connector 15"/>
+          <p:cNvCxnSpPr>
+            <a:stCxn id="7" idx="2"/>
+            <a:endCxn id="20" idx="0"/>
+          </p:cNvCxnSpPr>
+          <p:nvPr/>
+        </p:nvCxnSpPr>
+        <p:spPr>
+          <a:xfrm flipH="1">
+            <a:off x="4267200" y="5105400"/>
+            <a:ext cx="17318" cy="838200"/>
+          </a:xfrm>
+          <a:prstGeom prst="straightConnector1">
+            <a:avLst/>
+          </a:prstGeom>
+          <a:ln w="38100">
+            <a:tailEnd type="arrow"/>
+          </a:ln>
+        </p:spPr>
+        <p:style>
+          <a:lnRef idx="1">
+            <a:schemeClr val="dk1"/>
+          </a:lnRef>
+          <a:fillRef idx="0">
+            <a:schemeClr val="dk1"/>
+          </a:fillRef>
+          <a:effectRef idx="0">
+            <a:schemeClr val="dk1"/>
+          </a:effectRef>
+          <a:fontRef idx="minor">
+            <a:schemeClr val="tx1"/>
+          </a:fontRef>
+        </p:style>
+      </p:cxnSp>
+      <p:sp>
+        <p:nvSpPr>
+          <p:cNvPr id="20" name="TextBox 19"/>
+          <p:cNvSpPr txBox="1"/>
+          <p:nvPr/>
+        </p:nvSpPr>
+        <p:spPr>
+          <a:xfrm>
+            <a:off x="3657600" y="5943600"/>
+            <a:ext cx="1219200" cy="369332"/>
+          </a:xfrm>
+          <a:prstGeom prst="rect">
+            <a:avLst/>
+          </a:prstGeom>
+          <a:noFill/>
+        </p:spPr>
+        <p:txBody>
+          <a:bodyPr wrap="square" rtlCol="0">
+            <a:spAutoFit/>
+          </a:bodyPr>
+          <a:lstStyle/>
+          <a:p>
+            <a:r>
+              <a:rPr lang="en-US" dirty="0" smtClean="0"/>
+              <a:t>Not a face</a:t>
+            </a:r>
+            <a:endParaRPr lang="en-US" dirty="0"/>
+          </a:p>
+        </p:txBody>
+      </p:sp>
+      <p:cxnSp>
+        <p:nvCxnSpPr>
+          <p:cNvPr id="22" name="Straight Arrow Connector 21"/>
+          <p:cNvCxnSpPr>
+            <a:endCxn id="20" idx="3"/>
+          </p:cNvCxnSpPr>
+          <p:nvPr/>
+        </p:nvCxnSpPr>
+        <p:spPr>
+          <a:xfrm flipH="1">
+            <a:off x="4876800" y="5105400"/>
+            <a:ext cx="1998518" cy="1022866"/>
+          </a:xfrm>
+          <a:prstGeom prst="straightConnector1">
+            <a:avLst/>
+          </a:prstGeom>
+          <a:ln w="38100">
+            <a:tailEnd type="arrow"/>
+          </a:ln>
+        </p:spPr>
+        <p:style>
+          <a:lnRef idx="1">
+            <a:schemeClr val="dk1"/>
+          </a:lnRef>
+          <a:fillRef idx="0">
+            <a:schemeClr val="dk1"/>
+          </a:fillRef>
+          <a:effectRef idx="0">
+            <a:schemeClr val="dk1"/>
+          </a:effectRef>
+          <a:fontRef idx="minor">
+            <a:schemeClr val="tx1"/>
+          </a:fontRef>
+        </p:style>
+      </p:cxnSp>
+      <p:sp>
+        <p:nvSpPr>
+          <p:cNvPr id="26" name="TextBox 25"/>
+          <p:cNvSpPr txBox="1"/>
+          <p:nvPr/>
+        </p:nvSpPr>
+        <p:spPr>
+          <a:xfrm>
+            <a:off x="4419600" y="5334000"/>
+            <a:ext cx="533400" cy="369332"/>
+          </a:xfrm>
+          <a:prstGeom prst="rect">
+            <a:avLst/>
+          </a:prstGeom>
+          <a:noFill/>
+        </p:spPr>
+        <p:txBody>
+          <a:bodyPr wrap="square" rtlCol="0">
+            <a:spAutoFit/>
+          </a:bodyPr>
+          <a:lstStyle/>
+          <a:p>
+            <a:r>
+              <a:rPr lang="en-US" dirty="0" smtClean="0"/>
+              <a:t>Fail</a:t>
+            </a:r>
+            <a:endParaRPr lang="en-US" dirty="0"/>
+          </a:p>
+        </p:txBody>
+      </p:sp>
+      <p:sp>
+        <p:nvSpPr>
+          <p:cNvPr id="27" name="TextBox 26"/>
+          <p:cNvSpPr txBox="1"/>
+          <p:nvPr/>
+        </p:nvSpPr>
+        <p:spPr>
+          <a:xfrm>
+            <a:off x="5867400" y="5638800"/>
+            <a:ext cx="533400" cy="369332"/>
+          </a:xfrm>
+          <a:prstGeom prst="rect">
+            <a:avLst/>
+          </a:prstGeom>
+          <a:noFill/>
+        </p:spPr>
+        <p:txBody>
+          <a:bodyPr wrap="square" rtlCol="0">
+            <a:spAutoFit/>
+          </a:bodyPr>
+          <a:lstStyle/>
+          <a:p>
+            <a:r>
+              <a:rPr lang="en-US" dirty="0" smtClean="0"/>
+              <a:t>Fail</a:t>
+            </a:r>
+            <a:endParaRPr lang="en-US" dirty="0"/>
+          </a:p>
+        </p:txBody>
+      </p:sp>
+      <p:sp>
+        <p:nvSpPr>
+          <p:cNvPr id="28" name="TextBox 27"/>
+          <p:cNvSpPr txBox="1"/>
+          <p:nvPr/>
+        </p:nvSpPr>
+        <p:spPr>
+          <a:xfrm>
+            <a:off x="5257800" y="4191000"/>
+            <a:ext cx="685800" cy="369332"/>
+          </a:xfrm>
+          <a:prstGeom prst="rect">
+            <a:avLst/>
+          </a:prstGeom>
+          <a:noFill/>
+        </p:spPr>
+        <p:txBody>
+          <a:bodyPr wrap="square" rtlCol="0">
+            <a:spAutoFit/>
+          </a:bodyPr>
+          <a:lstStyle/>
+          <a:p>
+            <a:r>
+              <a:rPr lang="en-US" dirty="0" smtClean="0"/>
+              <a:t>Pass</a:t>
+            </a:r>
+            <a:endParaRPr lang="en-US" dirty="0"/>
+          </a:p>
+        </p:txBody>
+      </p:sp>
+      <p:sp>
+        <p:nvSpPr>
+          <p:cNvPr id="30" name="TextBox 29"/>
+          <p:cNvSpPr txBox="1"/>
+          <p:nvPr/>
+        </p:nvSpPr>
+        <p:spPr>
+          <a:xfrm>
+            <a:off x="7924800" y="4648200"/>
+            <a:ext cx="685800" cy="369332"/>
+          </a:xfrm>
+          <a:prstGeom prst="rect">
+            <a:avLst/>
+          </a:prstGeom>
+          <a:noFill/>
+        </p:spPr>
+        <p:txBody>
+          <a:bodyPr wrap="square" rtlCol="0">
+            <a:spAutoFit/>
+          </a:bodyPr>
+          <a:lstStyle/>
+          <a:p>
+            <a:r>
+              <a:rPr lang="en-US" dirty="0" smtClean="0"/>
+              <a:t>Pass</a:t>
+            </a:r>
+            <a:endParaRPr lang="en-US" dirty="0"/>
+          </a:p>
+        </p:txBody>
+      </p:sp>
+      <p:sp>
+        <p:nvSpPr>
+          <p:cNvPr id="32" name="TextBox 31"/>
+          <p:cNvSpPr txBox="1"/>
+          <p:nvPr/>
+        </p:nvSpPr>
+        <p:spPr>
+          <a:xfrm>
+            <a:off x="7391400" y="5943600"/>
+            <a:ext cx="1295400" cy="369332"/>
+          </a:xfrm>
+          <a:prstGeom prst="rect">
+            <a:avLst/>
+          </a:prstGeom>
+          <a:noFill/>
+        </p:spPr>
+        <p:txBody>
+          <a:bodyPr wrap="square" rtlCol="0">
+            <a:spAutoFit/>
+          </a:bodyPr>
+          <a:lstStyle/>
+          <a:p>
+            <a:r>
+              <a:rPr lang="en-US" dirty="0" smtClean="0"/>
+              <a:t>Is a face!</a:t>
+            </a:r>
+            <a:endParaRPr lang="en-US" dirty="0"/>
+          </a:p>
+        </p:txBody>
+      </p:sp>
+      <p:cxnSp>
+        <p:nvCxnSpPr>
+          <p:cNvPr id="34" name="Curved Connector 33"/>
+          <p:cNvCxnSpPr>
+            <a:stCxn id="8" idx="3"/>
+            <a:endCxn id="32" idx="0"/>
+          </p:cNvCxnSpPr>
+          <p:nvPr/>
+        </p:nvCxnSpPr>
+        <p:spPr>
+          <a:xfrm>
+            <a:off x="7730836" y="4610100"/>
+            <a:ext cx="308264" cy="1333500"/>
+          </a:xfrm>
+          <a:prstGeom prst="curvedConnector2">
+            <a:avLst/>
+          </a:prstGeom>
+          <a:ln w="38100">
+            <a:tailEnd type="arrow"/>
+          </a:ln>
+        </p:spPr>
+        <p:style>
+          <a:lnRef idx="1">
+            <a:schemeClr val="dk1"/>
+          </a:lnRef>
+          <a:fillRef idx="0">
+            <a:schemeClr val="dk1"/>
+          </a:fillRef>
+          <a:effectRef idx="0">
+            <a:schemeClr val="dk1"/>
+          </a:effectRef>
+          <a:fontRef idx="minor">
+            <a:schemeClr val="tx1"/>
+          </a:fontRef>
+        </p:style>
+      </p:cxnSp>
     </p:spTree>
   </p:cSld>
   <p:clrMapOvr>
@@ -3700,8 +4317,8 @@
               <a:t>Different </a:t>
             </a:r>
             <a:r>
-              <a:rPr lang="en-US" dirty="0" err="1" smtClean="0"/>
-              <a:t>subwindows</a:t>
+              <a:rPr lang="en-US" dirty="0" smtClean="0"/>
+              <a:t>sub-windows</a:t>
             </a:r>
             <a:endParaRPr lang="en-US" dirty="0" smtClean="0"/>
           </a:p>
@@ -3718,12 +4335,12 @@
               <a:t>Many different </a:t>
             </a:r>
             <a:r>
-              <a:rPr lang="en-US" sz="2600" dirty="0" err="1" smtClean="0"/>
-              <a:t>subwindows</a:t>
-            </a:r>
-            <a:r>
               <a:rPr lang="en-US" sz="2600" dirty="0" smtClean="0"/>
-              <a:t> per image at different offsets and different scales</a:t>
+              <a:t>sub-windows </a:t>
+            </a:r>
+            <a:r>
+              <a:rPr lang="en-US" sz="2600" dirty="0" smtClean="0"/>
+              <a:t>per image at different offsets and different scales</a:t>
             </a:r>
           </a:p>
           <a:p>
@@ -3892,8 +4509,13 @@
             </a:pPr>
             <a:r>
               <a:rPr lang="en-US" dirty="0" smtClean="0"/>
-              <a:t>Occupancy based on scale</a:t>
-            </a:r>
+              <a:t>Occupancy based on </a:t>
+            </a:r>
+            <a:r>
+              <a:rPr lang="en-US" dirty="0" smtClean="0"/>
+              <a:t>scale and different sized sub-windows</a:t>
+            </a:r>
+            <a:endParaRPr lang="en-US" dirty="0" smtClean="0"/>
           </a:p>
           <a:p>
             <a:pPr>

</xml_diff>

<commit_message>
Report and ppt work
</commit_message>
<xml_diff>
--- a/presentation/Face Detection on the GPU.pptx
+++ b/presentation/Face Detection on the GPU.pptx
@@ -14,6 +14,11 @@
     <p:sldId id="263" r:id="rId8"/>
     <p:sldId id="261" r:id="rId9"/>
     <p:sldId id="262" r:id="rId10"/>
+    <p:sldId id="266" r:id="rId11"/>
+    <p:sldId id="265" r:id="rId12"/>
+    <p:sldId id="267" r:id="rId13"/>
+    <p:sldId id="268" r:id="rId14"/>
+    <p:sldId id="269" r:id="rId15"/>
   </p:sldIdLst>
   <p:sldSz cx="9144000" cy="6858000" type="screen4x3"/>
   <p:notesSz cx="6858000" cy="9144000"/>
@@ -296,7 +301,8 @@
           <a:p>
             <a:fld id="{DE877FA8-6401-44AA-A199-0446E9745075}" type="datetimeFigureOut">
               <a:rPr lang="en-US" smtClean="0"/>
-              <a:t>3/13/2012</a:t>
+              <a:pPr/>
+              <a:t>3/14/2012</a:t>
             </a:fld>
             <a:endParaRPr lang="en-US"/>
           </a:p>
@@ -338,6 +344,7 @@
           <a:p>
             <a:fld id="{5F576237-7925-4578-81FE-7737AE0013B4}" type="slidenum">
               <a:rPr lang="en-US" smtClean="0"/>
+              <a:pPr/>
               <a:t>‹#›</a:t>
             </a:fld>
             <a:endParaRPr lang="en-US"/>
@@ -461,7 +468,8 @@
           <a:p>
             <a:fld id="{DE877FA8-6401-44AA-A199-0446E9745075}" type="datetimeFigureOut">
               <a:rPr lang="en-US" smtClean="0"/>
-              <a:t>3/13/2012</a:t>
+              <a:pPr/>
+              <a:t>3/14/2012</a:t>
             </a:fld>
             <a:endParaRPr lang="en-US"/>
           </a:p>
@@ -503,6 +511,7 @@
           <a:p>
             <a:fld id="{5F576237-7925-4578-81FE-7737AE0013B4}" type="slidenum">
               <a:rPr lang="en-US" smtClean="0"/>
+              <a:pPr/>
               <a:t>‹#›</a:t>
             </a:fld>
             <a:endParaRPr lang="en-US"/>
@@ -636,7 +645,8 @@
           <a:p>
             <a:fld id="{DE877FA8-6401-44AA-A199-0446E9745075}" type="datetimeFigureOut">
               <a:rPr lang="en-US" smtClean="0"/>
-              <a:t>3/13/2012</a:t>
+              <a:pPr/>
+              <a:t>3/14/2012</a:t>
             </a:fld>
             <a:endParaRPr lang="en-US"/>
           </a:p>
@@ -678,6 +688,7 @@
           <a:p>
             <a:fld id="{5F576237-7925-4578-81FE-7737AE0013B4}" type="slidenum">
               <a:rPr lang="en-US" smtClean="0"/>
+              <a:pPr/>
               <a:t>‹#›</a:t>
             </a:fld>
             <a:endParaRPr lang="en-US"/>
@@ -722,7 +733,11 @@
         <p:spPr/>
         <p:txBody>
           <a:bodyPr/>
-          <a:lstStyle/>
+          <a:lstStyle>
+            <a:lvl1pPr algn="l">
+              <a:defRPr/>
+            </a:lvl1pPr>
+          </a:lstStyle>
           <a:p>
             <a:r>
               <a:rPr lang="en-US" dirty="0" smtClean="0"/>
@@ -801,7 +816,8 @@
           <a:p>
             <a:fld id="{DE877FA8-6401-44AA-A199-0446E9745075}" type="datetimeFigureOut">
               <a:rPr lang="en-US" smtClean="0"/>
-              <a:t>3/13/2012</a:t>
+              <a:pPr/>
+              <a:t>3/14/2012</a:t>
             </a:fld>
             <a:endParaRPr lang="en-US"/>
           </a:p>
@@ -843,12 +859,51 @@
           <a:p>
             <a:fld id="{5F576237-7925-4578-81FE-7737AE0013B4}" type="slidenum">
               <a:rPr lang="en-US" smtClean="0"/>
+              <a:pPr/>
               <a:t>‹#›</a:t>
             </a:fld>
             <a:endParaRPr lang="en-US"/>
           </a:p>
         </p:txBody>
       </p:sp>
+      <p:cxnSp>
+        <p:nvCxnSpPr>
+          <p:cNvPr id="8" name="Straight Connector 7"/>
+          <p:cNvCxnSpPr/>
+          <p:nvPr userDrawn="1"/>
+        </p:nvCxnSpPr>
+        <p:spPr>
+          <a:xfrm>
+            <a:off x="533400" y="1219200"/>
+            <a:ext cx="6781800" cy="1588"/>
+          </a:xfrm>
+          <a:prstGeom prst="line">
+            <a:avLst/>
+          </a:prstGeom>
+          <a:ln w="38100">
+            <a:solidFill>
+              <a:schemeClr val="tx1">
+                <a:lumMod val="65000"/>
+                <a:lumOff val="35000"/>
+              </a:schemeClr>
+            </a:solidFill>
+          </a:ln>
+        </p:spPr>
+        <p:style>
+          <a:lnRef idx="1">
+            <a:schemeClr val="dk1"/>
+          </a:lnRef>
+          <a:fillRef idx="0">
+            <a:schemeClr val="dk1"/>
+          </a:fillRef>
+          <a:effectRef idx="0">
+            <a:schemeClr val="dk1"/>
+          </a:effectRef>
+          <a:fontRef idx="minor">
+            <a:schemeClr val="tx1"/>
+          </a:fontRef>
+        </p:style>
+      </p:cxnSp>
     </p:spTree>
   </p:cSld>
   <p:clrMapOvr>
@@ -1042,7 +1097,8 @@
           <a:p>
             <a:fld id="{DE877FA8-6401-44AA-A199-0446E9745075}" type="datetimeFigureOut">
               <a:rPr lang="en-US" smtClean="0"/>
-              <a:t>3/13/2012</a:t>
+              <a:pPr/>
+              <a:t>3/14/2012</a:t>
             </a:fld>
             <a:endParaRPr lang="en-US"/>
           </a:p>
@@ -1084,6 +1140,7 @@
           <a:p>
             <a:fld id="{5F576237-7925-4578-81FE-7737AE0013B4}" type="slidenum">
               <a:rPr lang="en-US" smtClean="0"/>
+              <a:pPr/>
               <a:t>‹#›</a:t>
             </a:fld>
             <a:endParaRPr lang="en-US"/>
@@ -1325,7 +1382,8 @@
           <a:p>
             <a:fld id="{DE877FA8-6401-44AA-A199-0446E9745075}" type="datetimeFigureOut">
               <a:rPr lang="en-US" smtClean="0"/>
-              <a:t>3/13/2012</a:t>
+              <a:pPr/>
+              <a:t>3/14/2012</a:t>
             </a:fld>
             <a:endParaRPr lang="en-US"/>
           </a:p>
@@ -1367,6 +1425,7 @@
           <a:p>
             <a:fld id="{5F576237-7925-4578-81FE-7737AE0013B4}" type="slidenum">
               <a:rPr lang="en-US" smtClean="0"/>
+              <a:pPr/>
               <a:t>‹#›</a:t>
             </a:fld>
             <a:endParaRPr lang="en-US"/>
@@ -1742,7 +1801,8 @@
           <a:p>
             <a:fld id="{DE877FA8-6401-44AA-A199-0446E9745075}" type="datetimeFigureOut">
               <a:rPr lang="en-US" smtClean="0"/>
-              <a:t>3/13/2012</a:t>
+              <a:pPr/>
+              <a:t>3/14/2012</a:t>
             </a:fld>
             <a:endParaRPr lang="en-US"/>
           </a:p>
@@ -1784,6 +1844,7 @@
           <a:p>
             <a:fld id="{5F576237-7925-4578-81FE-7737AE0013B4}" type="slidenum">
               <a:rPr lang="en-US" smtClean="0"/>
+              <a:pPr/>
               <a:t>‹#›</a:t>
             </a:fld>
             <a:endParaRPr lang="en-US"/>
@@ -1855,7 +1916,8 @@
           <a:p>
             <a:fld id="{DE877FA8-6401-44AA-A199-0446E9745075}" type="datetimeFigureOut">
               <a:rPr lang="en-US" smtClean="0"/>
-              <a:t>3/13/2012</a:t>
+              <a:pPr/>
+              <a:t>3/14/2012</a:t>
             </a:fld>
             <a:endParaRPr lang="en-US"/>
           </a:p>
@@ -1897,6 +1959,7 @@
           <a:p>
             <a:fld id="{5F576237-7925-4578-81FE-7737AE0013B4}" type="slidenum">
               <a:rPr lang="en-US" smtClean="0"/>
+              <a:pPr/>
               <a:t>‹#›</a:t>
             </a:fld>
             <a:endParaRPr lang="en-US"/>
@@ -1945,7 +2008,8 @@
           <a:p>
             <a:fld id="{DE877FA8-6401-44AA-A199-0446E9745075}" type="datetimeFigureOut">
               <a:rPr lang="en-US" smtClean="0"/>
-              <a:t>3/13/2012</a:t>
+              <a:pPr/>
+              <a:t>3/14/2012</a:t>
             </a:fld>
             <a:endParaRPr lang="en-US"/>
           </a:p>
@@ -1987,6 +2051,7 @@
           <a:p>
             <a:fld id="{5F576237-7925-4578-81FE-7737AE0013B4}" type="slidenum">
               <a:rPr lang="en-US" smtClean="0"/>
+              <a:pPr/>
               <a:t>‹#›</a:t>
             </a:fld>
             <a:endParaRPr lang="en-US"/>
@@ -2217,7 +2282,8 @@
           <a:p>
             <a:fld id="{DE877FA8-6401-44AA-A199-0446E9745075}" type="datetimeFigureOut">
               <a:rPr lang="en-US" smtClean="0"/>
-              <a:t>3/13/2012</a:t>
+              <a:pPr/>
+              <a:t>3/14/2012</a:t>
             </a:fld>
             <a:endParaRPr lang="en-US"/>
           </a:p>
@@ -2259,6 +2325,7 @@
           <a:p>
             <a:fld id="{5F576237-7925-4578-81FE-7737AE0013B4}" type="slidenum">
               <a:rPr lang="en-US" smtClean="0"/>
+              <a:pPr/>
               <a:t>‹#›</a:t>
             </a:fld>
             <a:endParaRPr lang="en-US"/>
@@ -2465,7 +2532,8 @@
           <a:p>
             <a:fld id="{DE877FA8-6401-44AA-A199-0446E9745075}" type="datetimeFigureOut">
               <a:rPr lang="en-US" smtClean="0"/>
-              <a:t>3/13/2012</a:t>
+              <a:pPr/>
+              <a:t>3/14/2012</a:t>
             </a:fld>
             <a:endParaRPr lang="en-US"/>
           </a:p>
@@ -2507,6 +2575,7 @@
           <a:p>
             <a:fld id="{5F576237-7925-4578-81FE-7737AE0013B4}" type="slidenum">
               <a:rPr lang="en-US" smtClean="0"/>
+              <a:pPr/>
               <a:t>‹#›</a:t>
             </a:fld>
             <a:endParaRPr lang="en-US"/>
@@ -2673,7 +2742,8 @@
           <a:p>
             <a:fld id="{DE877FA8-6401-44AA-A199-0446E9745075}" type="datetimeFigureOut">
               <a:rPr lang="en-US" smtClean="0"/>
-              <a:t>3/13/2012</a:t>
+              <a:pPr/>
+              <a:t>3/14/2012</a:t>
             </a:fld>
             <a:endParaRPr lang="en-US"/>
           </a:p>
@@ -2751,6 +2821,7 @@
           <a:p>
             <a:fld id="{5F576237-7925-4578-81FE-7737AE0013B4}" type="slidenum">
               <a:rPr lang="en-US" smtClean="0"/>
+              <a:pPr/>
               <a:t>‹#›</a:t>
             </a:fld>
             <a:endParaRPr lang="en-US"/>
@@ -3098,6 +3169,538 @@
   <p:clrMapOvr>
     <a:masterClrMapping/>
   </p:clrMapOvr>
+  <p:timing>
+    <p:tnLst>
+      <p:par>
+        <p:cTn id="1" dur="indefinite" restart="never" nodeType="tmRoot"/>
+      </p:par>
+    </p:tnLst>
+  </p:timing>
+</p:sld>
+</file>
+
+<file path=ppt/slides/slide10.xml><?xml version="1.0" encoding="utf-8"?>
+<p:sld xmlns:a="http://schemas.openxmlformats.org/drawingml/2006/main" xmlns:r="http://schemas.openxmlformats.org/officeDocument/2006/relationships" xmlns:p="http://schemas.openxmlformats.org/presentationml/2006/main">
+  <p:cSld>
+    <p:spTree>
+      <p:nvGrpSpPr>
+        <p:cNvPr id="1" name=""/>
+        <p:cNvGrpSpPr/>
+        <p:nvPr/>
+      </p:nvGrpSpPr>
+      <p:grpSpPr>
+        <a:xfrm>
+          <a:off x="0" y="0"/>
+          <a:ext cx="0" cy="0"/>
+          <a:chOff x="0" y="0"/>
+          <a:chExt cx="0" cy="0"/>
+        </a:xfrm>
+      </p:grpSpPr>
+      <p:sp>
+        <p:nvSpPr>
+          <p:cNvPr id="2" name="Title 1"/>
+          <p:cNvSpPr>
+            <a:spLocks noGrp="1"/>
+          </p:cNvSpPr>
+          <p:nvPr>
+            <p:ph type="title"/>
+          </p:nvPr>
+        </p:nvSpPr>
+        <p:spPr/>
+        <p:txBody>
+          <a:bodyPr/>
+          <a:lstStyle/>
+          <a:p>
+            <a:r>
+              <a:rPr lang="en-US" dirty="0" smtClean="0"/>
+              <a:t>Computing Integral Images</a:t>
+            </a:r>
+            <a:endParaRPr lang="en-US" dirty="0"/>
+          </a:p>
+        </p:txBody>
+      </p:sp>
+      <p:sp>
+        <p:nvSpPr>
+          <p:cNvPr id="3" name="Content Placeholder 2"/>
+          <p:cNvSpPr>
+            <a:spLocks noGrp="1"/>
+          </p:cNvSpPr>
+          <p:nvPr>
+            <p:ph idx="1"/>
+          </p:nvPr>
+        </p:nvSpPr>
+        <p:spPr>
+          <a:xfrm>
+            <a:off x="457200" y="1600200"/>
+            <a:ext cx="8229600" cy="4953000"/>
+          </a:xfrm>
+        </p:spPr>
+        <p:txBody>
+          <a:bodyPr>
+            <a:normAutofit/>
+          </a:bodyPr>
+          <a:lstStyle/>
+          <a:p>
+            <a:pPr>
+              <a:buNone/>
+            </a:pPr>
+            <a:r>
+              <a:rPr lang="en-US" dirty="0" smtClean="0"/>
+              <a:t>Parallel approach (GPU): </a:t>
+            </a:r>
+          </a:p>
+          <a:p>
+            <a:pPr>
+              <a:buNone/>
+            </a:pPr>
+            <a:r>
+              <a:rPr lang="en-US" sz="2600" dirty="0" smtClean="0"/>
+              <a:t>	</a:t>
+            </a:r>
+            <a:r>
+              <a:rPr lang="en-US" sz="2600" dirty="0" smtClean="0"/>
+              <a:t>compute all pixels above (column scan)</a:t>
+            </a:r>
+          </a:p>
+          <a:p>
+            <a:pPr>
+              <a:buNone/>
+            </a:pPr>
+            <a:r>
+              <a:rPr lang="en-US" sz="2600" dirty="0" smtClean="0"/>
+              <a:t>	</a:t>
+            </a:r>
+            <a:r>
+              <a:rPr lang="en-US" sz="2600" dirty="0" smtClean="0"/>
+              <a:t>then add the column scan values of each location to the left (row scan)</a:t>
+            </a:r>
+          </a:p>
+          <a:p>
+            <a:pPr>
+              <a:buNone/>
+            </a:pPr>
+            <a:endParaRPr lang="en-US" sz="2600" dirty="0" smtClean="0"/>
+          </a:p>
+          <a:p>
+            <a:pPr>
+              <a:buNone/>
+            </a:pPr>
+            <a:r>
+              <a:rPr lang="en-US" dirty="0" smtClean="0"/>
+              <a:t>Serial approach (CPU): </a:t>
+            </a:r>
+          </a:p>
+          <a:p>
+            <a:pPr>
+              <a:buNone/>
+            </a:pPr>
+            <a:r>
+              <a:rPr lang="en-US" dirty="0" smtClean="0"/>
+              <a:t>	</a:t>
+            </a:r>
+            <a:r>
+              <a:rPr lang="en-US" sz="2600" dirty="0" smtClean="0"/>
+              <a:t>Just iterate through from top left down to bottom right and add the neighbors</a:t>
+            </a:r>
+          </a:p>
+          <a:p>
+            <a:pPr>
+              <a:buNone/>
+            </a:pPr>
+            <a:r>
+              <a:rPr lang="en-US" dirty="0" smtClean="0"/>
+              <a:t>Results: CPU wins (0.000709s vs. 0.005148s)</a:t>
+            </a:r>
+            <a:endParaRPr lang="en-US" dirty="0" smtClean="0"/>
+          </a:p>
+        </p:txBody>
+      </p:sp>
+    </p:spTree>
+  </p:cSld>
+  <p:clrMapOvr>
+    <a:masterClrMapping/>
+  </p:clrMapOvr>
+  <p:timing>
+    <p:tnLst>
+      <p:par>
+        <p:cTn id="1" dur="indefinite" restart="never" nodeType="tmRoot"/>
+      </p:par>
+    </p:tnLst>
+  </p:timing>
+</p:sld>
+</file>
+
+<file path=ppt/slides/slide11.xml><?xml version="1.0" encoding="utf-8"?>
+<p:sld xmlns:a="http://schemas.openxmlformats.org/drawingml/2006/main" xmlns:r="http://schemas.openxmlformats.org/officeDocument/2006/relationships" xmlns:p="http://schemas.openxmlformats.org/presentationml/2006/main">
+  <p:cSld>
+    <p:spTree>
+      <p:nvGrpSpPr>
+        <p:cNvPr id="1" name=""/>
+        <p:cNvGrpSpPr/>
+        <p:nvPr/>
+      </p:nvGrpSpPr>
+      <p:grpSpPr>
+        <a:xfrm>
+          <a:off x="0" y="0"/>
+          <a:ext cx="0" cy="0"/>
+          <a:chOff x="0" y="0"/>
+          <a:chExt cx="0" cy="0"/>
+        </a:xfrm>
+      </p:grpSpPr>
+      <p:sp>
+        <p:nvSpPr>
+          <p:cNvPr id="2" name="Title 1"/>
+          <p:cNvSpPr>
+            <a:spLocks noGrp="1"/>
+          </p:cNvSpPr>
+          <p:nvPr>
+            <p:ph type="title"/>
+          </p:nvPr>
+        </p:nvSpPr>
+        <p:spPr/>
+        <p:txBody>
+          <a:bodyPr/>
+          <a:lstStyle/>
+          <a:p>
+            <a:r>
+              <a:rPr lang="en-US" dirty="0" smtClean="0"/>
+              <a:t>Occupancy Based on Scale</a:t>
+            </a:r>
+            <a:endParaRPr lang="en-US" dirty="0"/>
+          </a:p>
+        </p:txBody>
+      </p:sp>
+      <p:sp>
+        <p:nvSpPr>
+          <p:cNvPr id="3" name="Content Placeholder 2"/>
+          <p:cNvSpPr>
+            <a:spLocks noGrp="1"/>
+          </p:cNvSpPr>
+          <p:nvPr>
+            <p:ph idx="1"/>
+          </p:nvPr>
+        </p:nvSpPr>
+        <p:spPr/>
+        <p:txBody>
+          <a:bodyPr/>
+          <a:lstStyle/>
+          <a:p>
+            <a:pPr>
+              <a:buNone/>
+            </a:pPr>
+            <a:r>
+              <a:rPr lang="en-US" dirty="0" smtClean="0"/>
+              <a:t>Different scales of identifiers equals more concurrent threads that can be run</a:t>
+            </a:r>
+          </a:p>
+          <a:p>
+            <a:pPr>
+              <a:buNone/>
+            </a:pPr>
+            <a:r>
+              <a:rPr lang="en-US" dirty="0" smtClean="0"/>
+              <a:t>Each thread only using ~10 registers so no local memory issues</a:t>
+            </a:r>
+          </a:p>
+          <a:p>
+            <a:pPr>
+              <a:buNone/>
+            </a:pPr>
+            <a:endParaRPr lang="en-US" dirty="0" smtClean="0"/>
+          </a:p>
+          <a:p>
+            <a:pPr>
+              <a:buNone/>
+            </a:pPr>
+            <a:endParaRPr lang="en-US" dirty="0" smtClean="0"/>
+          </a:p>
+          <a:p>
+            <a:pPr>
+              <a:buNone/>
+            </a:pPr>
+            <a:r>
+              <a:rPr lang="en-US" dirty="0" smtClean="0"/>
+              <a:t>Optimal thread count (based on CUDA calculator): 128 threads per block</a:t>
+            </a:r>
+          </a:p>
+        </p:txBody>
+      </p:sp>
+    </p:spTree>
+  </p:cSld>
+  <p:clrMapOvr>
+    <a:masterClrMapping/>
+  </p:clrMapOvr>
+</p:sld>
+</file>
+
+<file path=ppt/slides/slide12.xml><?xml version="1.0" encoding="utf-8"?>
+<p:sld xmlns:a="http://schemas.openxmlformats.org/drawingml/2006/main" xmlns:r="http://schemas.openxmlformats.org/officeDocument/2006/relationships" xmlns:p="http://schemas.openxmlformats.org/presentationml/2006/main">
+  <p:cSld>
+    <p:spTree>
+      <p:nvGrpSpPr>
+        <p:cNvPr id="1" name=""/>
+        <p:cNvGrpSpPr/>
+        <p:nvPr/>
+      </p:nvGrpSpPr>
+      <p:grpSpPr>
+        <a:xfrm>
+          <a:off x="0" y="0"/>
+          <a:ext cx="0" cy="0"/>
+          <a:chOff x="0" y="0"/>
+          <a:chExt cx="0" cy="0"/>
+        </a:xfrm>
+      </p:grpSpPr>
+      <p:sp>
+        <p:nvSpPr>
+          <p:cNvPr id="2" name="Title 1"/>
+          <p:cNvSpPr>
+            <a:spLocks noGrp="1"/>
+          </p:cNvSpPr>
+          <p:nvPr>
+            <p:ph type="title"/>
+          </p:nvPr>
+        </p:nvSpPr>
+        <p:spPr/>
+        <p:txBody>
+          <a:bodyPr/>
+          <a:lstStyle/>
+          <a:p>
+            <a:r>
+              <a:rPr lang="en-US" dirty="0" smtClean="0"/>
+              <a:t>Memory Coalescing</a:t>
+            </a:r>
+            <a:endParaRPr lang="en-US" dirty="0"/>
+          </a:p>
+        </p:txBody>
+      </p:sp>
+      <p:sp>
+        <p:nvSpPr>
+          <p:cNvPr id="3" name="Content Placeholder 2"/>
+          <p:cNvSpPr>
+            <a:spLocks noGrp="1"/>
+          </p:cNvSpPr>
+          <p:nvPr>
+            <p:ph idx="1"/>
+          </p:nvPr>
+        </p:nvSpPr>
+        <p:spPr/>
+        <p:txBody>
+          <a:bodyPr/>
+          <a:lstStyle/>
+          <a:p>
+            <a:pPr>
+              <a:buNone/>
+            </a:pPr>
+            <a:r>
+              <a:rPr lang="en-US" dirty="0" smtClean="0"/>
+              <a:t>Classifier memory accesses are not regular</a:t>
+            </a:r>
+          </a:p>
+          <a:p>
+            <a:pPr>
+              <a:buNone/>
+            </a:pPr>
+            <a:endParaRPr lang="en-US" dirty="0" smtClean="0"/>
+          </a:p>
+          <a:p>
+            <a:pPr>
+              <a:buNone/>
+            </a:pPr>
+            <a:r>
+              <a:rPr lang="en-US" dirty="0" smtClean="0"/>
+              <a:t>Each classifier skips several pixels as it is scanned across the image</a:t>
+            </a:r>
+          </a:p>
+          <a:p>
+            <a:pPr>
+              <a:buNone/>
+            </a:pPr>
+            <a:endParaRPr lang="en-US" dirty="0" smtClean="0"/>
+          </a:p>
+          <a:p>
+            <a:pPr>
+              <a:buNone/>
+            </a:pPr>
+            <a:r>
+              <a:rPr lang="en-US" dirty="0" smtClean="0"/>
+              <a:t>Issue: How to make these sparse but predictable memory accesses coalesce?</a:t>
+            </a:r>
+            <a:endParaRPr lang="en-US" dirty="0" smtClean="0"/>
+          </a:p>
+        </p:txBody>
+      </p:sp>
+    </p:spTree>
+  </p:cSld>
+  <p:clrMapOvr>
+    <a:masterClrMapping/>
+  </p:clrMapOvr>
+</p:sld>
+</file>
+
+<file path=ppt/slides/slide13.xml><?xml version="1.0" encoding="utf-8"?>
+<p:sld xmlns:a="http://schemas.openxmlformats.org/drawingml/2006/main" xmlns:r="http://schemas.openxmlformats.org/officeDocument/2006/relationships" xmlns:p="http://schemas.openxmlformats.org/presentationml/2006/main">
+  <p:cSld>
+    <p:spTree>
+      <p:nvGrpSpPr>
+        <p:cNvPr id="1" name=""/>
+        <p:cNvGrpSpPr/>
+        <p:nvPr/>
+      </p:nvGrpSpPr>
+      <p:grpSpPr>
+        <a:xfrm>
+          <a:off x="0" y="0"/>
+          <a:ext cx="0" cy="0"/>
+          <a:chOff x="0" y="0"/>
+          <a:chExt cx="0" cy="0"/>
+        </a:xfrm>
+      </p:grpSpPr>
+      <p:sp>
+        <p:nvSpPr>
+          <p:cNvPr id="2" name="Title 1"/>
+          <p:cNvSpPr>
+            <a:spLocks noGrp="1"/>
+          </p:cNvSpPr>
+          <p:nvPr>
+            <p:ph type="title"/>
+          </p:nvPr>
+        </p:nvSpPr>
+        <p:spPr/>
+        <p:txBody>
+          <a:bodyPr/>
+          <a:lstStyle/>
+          <a:p>
+            <a:r>
+              <a:rPr lang="en-US" dirty="0" smtClean="0"/>
+              <a:t>Cascade versus Non-Cascade</a:t>
+            </a:r>
+            <a:endParaRPr lang="en-US" dirty="0"/>
+          </a:p>
+        </p:txBody>
+      </p:sp>
+      <p:sp>
+        <p:nvSpPr>
+          <p:cNvPr id="3" name="Content Placeholder 2"/>
+          <p:cNvSpPr>
+            <a:spLocks noGrp="1"/>
+          </p:cNvSpPr>
+          <p:nvPr>
+            <p:ph idx="1"/>
+          </p:nvPr>
+        </p:nvSpPr>
+        <p:spPr/>
+        <p:txBody>
+          <a:bodyPr/>
+          <a:lstStyle/>
+          <a:p>
+            <a:pPr>
+              <a:buNone/>
+            </a:pPr>
+            <a:r>
+              <a:rPr lang="en-US" dirty="0" smtClean="0"/>
+              <a:t>On CPU, cascading removes a ton of work and is a net win</a:t>
+            </a:r>
+          </a:p>
+          <a:p>
+            <a:pPr>
+              <a:buNone/>
+            </a:pPr>
+            <a:r>
+              <a:rPr lang="en-US" dirty="0" smtClean="0"/>
+              <a:t>On GPU, parallel units can do the extra work that makes cascading lose some of its advantage</a:t>
+            </a:r>
+          </a:p>
+          <a:p>
+            <a:pPr>
+              <a:buNone/>
+            </a:pPr>
+            <a:r>
+              <a:rPr lang="en-US" dirty="0" smtClean="0"/>
+              <a:t>	</a:t>
+            </a:r>
+            <a:r>
+              <a:rPr lang="en-US" sz="2600" dirty="0" smtClean="0"/>
+              <a:t>Removing the bad sub-windows also takes GPU time (scan)</a:t>
+            </a:r>
+            <a:endParaRPr lang="en-US" dirty="0"/>
+          </a:p>
+        </p:txBody>
+      </p:sp>
+    </p:spTree>
+  </p:cSld>
+  <p:clrMapOvr>
+    <a:masterClrMapping/>
+  </p:clrMapOvr>
+</p:sld>
+</file>
+
+<file path=ppt/slides/slide14.xml><?xml version="1.0" encoding="utf-8"?>
+<p:sld xmlns:a="http://schemas.openxmlformats.org/drawingml/2006/main" xmlns:r="http://schemas.openxmlformats.org/officeDocument/2006/relationships" xmlns:p="http://schemas.openxmlformats.org/presentationml/2006/main">
+  <p:cSld>
+    <p:spTree>
+      <p:nvGrpSpPr>
+        <p:cNvPr id="1" name=""/>
+        <p:cNvGrpSpPr/>
+        <p:nvPr/>
+      </p:nvGrpSpPr>
+      <p:grpSpPr>
+        <a:xfrm>
+          <a:off x="0" y="0"/>
+          <a:ext cx="0" cy="0"/>
+          <a:chOff x="0" y="0"/>
+          <a:chExt cx="0" cy="0"/>
+        </a:xfrm>
+      </p:grpSpPr>
+      <p:pic>
+        <p:nvPicPr>
+          <p:cNvPr id="4" name="Content Placeholder 3" descr="Inverted_question_mark_alternate.png"/>
+          <p:cNvPicPr>
+            <a:picLocks noGrp="1" noChangeAspect="1"/>
+          </p:cNvPicPr>
+          <p:nvPr>
+            <p:ph idx="1"/>
+          </p:nvPr>
+        </p:nvPicPr>
+        <p:blipFill>
+          <a:blip r:embed="rId2"/>
+          <a:stretch>
+            <a:fillRect/>
+          </a:stretch>
+        </p:blipFill>
+        <p:spPr>
+          <a:xfrm rot="8207716">
+            <a:off x="2663739" y="1908562"/>
+            <a:ext cx="3583453" cy="4525963"/>
+          </a:xfrm>
+        </p:spPr>
+      </p:pic>
+      <p:sp>
+        <p:nvSpPr>
+          <p:cNvPr id="2" name="Title 1"/>
+          <p:cNvSpPr>
+            <a:spLocks noGrp="1"/>
+          </p:cNvSpPr>
+          <p:nvPr>
+            <p:ph type="title"/>
+          </p:nvPr>
+        </p:nvSpPr>
+        <p:spPr/>
+        <p:txBody>
+          <a:bodyPr/>
+          <a:lstStyle/>
+          <a:p>
+            <a:r>
+              <a:rPr lang="en-US" dirty="0" smtClean="0"/>
+              <a:t>Questions</a:t>
+            </a:r>
+            <a:endParaRPr lang="en-US" dirty="0"/>
+          </a:p>
+        </p:txBody>
+      </p:sp>
+    </p:spTree>
+  </p:cSld>
+  <p:clrMapOvr>
+    <a:masterClrMapping/>
+  </p:clrMapOvr>
 </p:sld>
 </file>
 
@@ -3172,6 +3775,13 @@
   <p:clrMapOvr>
     <a:masterClrMapping/>
   </p:clrMapOvr>
+  <p:timing>
+    <p:tnLst>
+      <p:par>
+        <p:cTn id="1" dur="indefinite" restart="never" nodeType="tmRoot"/>
+      </p:par>
+    </p:tnLst>
+  </p:timing>
 </p:sld>
 </file>
 
@@ -3230,7 +3840,7 @@
           <a:bodyPr/>
           <a:lstStyle/>
           <a:p>
-            <a:pPr>
+            <a:pPr marL="0" indent="0">
               <a:buNone/>
             </a:pPr>
             <a:r>
@@ -3239,7 +3849,7 @@
             </a:r>
           </a:p>
           <a:p>
-            <a:pPr>
+            <a:pPr marL="347472" indent="-347472">
               <a:buNone/>
             </a:pPr>
             <a:r>
@@ -3248,7 +3858,7 @@
             </a:r>
           </a:p>
           <a:p>
-            <a:pPr>
+            <a:pPr marL="347472" indent="-347472">
               <a:buNone/>
             </a:pPr>
             <a:r>
@@ -3280,6 +3890,13 @@
   <p:clrMapOvr>
     <a:masterClrMapping/>
   </p:clrMapOvr>
+  <p:timing>
+    <p:tnLst>
+      <p:par>
+        <p:cTn id="1" dur="indefinite" restart="never" nodeType="tmRoot"/>
+      </p:par>
+    </p:tnLst>
+  </p:timing>
 </p:sld>
 </file>
 
@@ -3343,7 +3960,7 @@
           <a:bodyPr/>
           <a:lstStyle/>
           <a:p>
-            <a:pPr>
+            <a:pPr marL="347472">
               <a:buNone/>
             </a:pPr>
             <a:r>
@@ -3352,7 +3969,7 @@
             </a:r>
           </a:p>
           <a:p>
-            <a:pPr>
+            <a:pPr marL="347472">
               <a:buNone/>
             </a:pPr>
             <a:r>
@@ -3361,7 +3978,7 @@
             </a:r>
           </a:p>
           <a:p>
-            <a:pPr>
+            <a:pPr marL="347472">
               <a:buNone/>
             </a:pPr>
             <a:r>
@@ -3403,6 +4020,13 @@
   <p:clrMapOvr>
     <a:masterClrMapping/>
   </p:clrMapOvr>
+  <p:timing>
+    <p:tnLst>
+      <p:par>
+        <p:cTn id="1" dur="indefinite" restart="never" nodeType="tmRoot"/>
+      </p:par>
+    </p:tnLst>
+  </p:timing>
 </p:sld>
 </file>
 
@@ -3484,11 +4108,7 @@
             </a:pPr>
             <a:r>
               <a:rPr lang="en-US" dirty="0" smtClean="0"/>
-              <a:t>(insert flow </a:t>
-            </a:r>
-            <a:r>
-              <a:rPr lang="en-US" smtClean="0"/>
-              <a:t>chart image)</a:t>
+              <a:t>(insert flow chart image)</a:t>
             </a:r>
             <a:endParaRPr lang="en-US" dirty="0"/>
           </a:p>
@@ -3499,6 +4119,13 @@
   <p:clrMapOvr>
     <a:masterClrMapping/>
   </p:clrMapOvr>
+  <p:timing>
+    <p:tnLst>
+      <p:par>
+        <p:cTn id="1" dur="indefinite" restart="never" nodeType="tmRoot"/>
+      </p:par>
+    </p:tnLst>
+  </p:timing>
 </p:sld>
 </file>
 
@@ -3563,19 +4190,42 @@
         <p:spPr>
           <a:xfrm>
             <a:off x="457200" y="1600200"/>
-            <a:ext cx="3810000" cy="4525963"/>
+            <a:ext cx="4267200" cy="4525963"/>
           </a:xfrm>
         </p:spPr>
         <p:txBody>
           <a:bodyPr/>
           <a:lstStyle/>
           <a:p>
-            <a:pPr>
+            <a:pPr marL="0">
               <a:buNone/>
             </a:pPr>
             <a:r>
               <a:rPr lang="en-US" dirty="0" smtClean="0"/>
-              <a:t>One extra classifier to determine whether the faces detected have glasses on or not</a:t>
+              <a:t>One extra classifier to determine whether the faces detected have glasses on or </a:t>
+            </a:r>
+            <a:r>
+              <a:rPr lang="en-US" dirty="0" smtClean="0"/>
+              <a:t>not</a:t>
+            </a:r>
+          </a:p>
+          <a:p>
+            <a:pPr marL="0">
+              <a:buNone/>
+            </a:pPr>
+            <a:endParaRPr lang="en-US" dirty="0" smtClean="0"/>
+          </a:p>
+          <a:p>
+            <a:pPr marL="0">
+              <a:buNone/>
+            </a:pPr>
+            <a:r>
+              <a:rPr lang="en-US" dirty="0" smtClean="0"/>
+              <a:t>Overly simple but just a smal</a:t>
+            </a:r>
+            <a:r>
+              <a:rPr lang="en-US" dirty="0" smtClean="0"/>
+              <a:t>l extension of the algorithm</a:t>
             </a:r>
             <a:endParaRPr lang="en-US" dirty="0"/>
           </a:p>
@@ -3612,6 +4262,13 @@
   <p:clrMapOvr>
     <a:masterClrMapping/>
   </p:clrMapOvr>
+  <p:timing>
+    <p:tnLst>
+      <p:par>
+        <p:cTn id="1" dur="indefinite" restart="never" nodeType="tmRoot"/>
+      </p:par>
+    </p:tnLst>
+  </p:timing>
 </p:sld>
 </file>
 
@@ -3756,6 +4413,13 @@
   <p:clrMapOvr>
     <a:masterClrMapping/>
   </p:clrMapOvr>
+  <p:timing>
+    <p:tnLst>
+      <p:par>
+        <p:cTn id="1" dur="indefinite" restart="never" nodeType="tmRoot"/>
+      </p:par>
+    </p:tnLst>
+  </p:timing>
 </p:sld>
 </file>
 
@@ -3827,6 +4491,13 @@
   <p:clrMapOvr>
     <a:masterClrMapping/>
   </p:clrMapOvr>
+  <p:timing>
+    <p:tnLst>
+      <p:par>
+        <p:cTn id="1" dur="indefinite" restart="never" nodeType="tmRoot"/>
+      </p:par>
+    </p:tnLst>
+  </p:timing>
 </p:sld>
 </file>
 
@@ -3892,7 +4563,7 @@
             </a:pPr>
             <a:r>
               <a:rPr lang="en-US" dirty="0" smtClean="0"/>
-              <a:t>Occupancy based on scale</a:t>
+              <a:t>Integral images on GPU vs. CPU</a:t>
             </a:r>
           </a:p>
           <a:p>
@@ -3901,7 +4572,15 @@
             </a:pPr>
             <a:r>
               <a:rPr lang="en-US" dirty="0" smtClean="0"/>
-              <a:t>Integral images on GPU vs. CPU</a:t>
+              <a:t>Occupancy </a:t>
+            </a:r>
+            <a:r>
+              <a:rPr lang="en-US" dirty="0" smtClean="0"/>
+              <a:t>based on </a:t>
+            </a:r>
+            <a:r>
+              <a:rPr lang="en-US" dirty="0" smtClean="0"/>
+              <a:t>scale</a:t>
             </a:r>
           </a:p>
           <a:p>
@@ -3910,9 +4589,30 @@
             </a:pPr>
             <a:r>
               <a:rPr lang="en-US" dirty="0" smtClean="0"/>
-              <a:t>Cascade versus non-cascade on GPU</a:t>
-            </a:r>
-            <a:endParaRPr lang="en-US" dirty="0"/>
+              <a:t>Issues with memory </a:t>
+            </a:r>
+            <a:r>
+              <a:rPr lang="en-US" dirty="0" smtClean="0"/>
+              <a:t>coalescing</a:t>
+            </a:r>
+            <a:endParaRPr lang="en-US" dirty="0" smtClean="0"/>
+          </a:p>
+          <a:p>
+            <a:pPr>
+              <a:buNone/>
+            </a:pPr>
+            <a:r>
+              <a:rPr lang="en-US" dirty="0" smtClean="0"/>
+              <a:t>Cascade </a:t>
+            </a:r>
+            <a:r>
+              <a:rPr lang="en-US" dirty="0" smtClean="0"/>
+              <a:t>versus non-cascade on </a:t>
+            </a:r>
+            <a:r>
+              <a:rPr lang="en-US" dirty="0" smtClean="0"/>
+              <a:t>GPU</a:t>
+            </a:r>
           </a:p>
         </p:txBody>
       </p:sp>
@@ -3921,6 +4621,13 @@
   <p:clrMapOvr>
     <a:masterClrMapping/>
   </p:clrMapOvr>
+  <p:timing>
+    <p:tnLst>
+      <p:par>
+        <p:cTn id="1" dur="indefinite" restart="never" nodeType="tmRoot"/>
+      </p:par>
+    </p:tnLst>
+  </p:timing>
 </p:sld>
 </file>
 

</xml_diff>

<commit_message>
Documentation updates, report about half done, presentation has all the info
</commit_message>
<xml_diff>
--- a/presentation/Face Detection on the GPU.pptx
+++ b/presentation/Face Detection on the GPU.pptx
@@ -3237,7 +3237,7 @@
         </p:spPr>
         <p:txBody>
           <a:bodyPr>
-            <a:normAutofit/>
+            <a:normAutofit lnSpcReduction="10000"/>
           </a:bodyPr>
           <a:lstStyle/>
           <a:p>
@@ -3264,7 +3264,11 @@
             </a:pPr>
             <a:r>
               <a:rPr lang="en-US" sz="2600" dirty="0" smtClean="0"/>
-              <a:t>	then add the column scan values of each location to the left (row scan)</a:t>
+              <a:t>	then add the column scan values of each location to the left (row scan</a:t>
+            </a:r>
+            <a:r>
+              <a:rPr lang="en-US" sz="2600" dirty="0" smtClean="0"/>
+              <a:t>)</a:t>
             </a:r>
           </a:p>
           <a:p>
@@ -3279,7 +3283,11 @@
             </a:pPr>
             <a:r>
               <a:rPr lang="en-US" dirty="0" smtClean="0"/>
-              <a:t>Serial approach (CPU): </a:t>
+              <a:t>Serial </a:t>
+            </a:r>
+            <a:r>
+              <a:rPr lang="en-US" dirty="0" smtClean="0"/>
+              <a:t>approach (CPU): </a:t>
             </a:r>
           </a:p>
           <a:p>
@@ -3292,8 +3300,18 @@
             </a:r>
             <a:r>
               <a:rPr lang="en-US" sz="2600" dirty="0" smtClean="0"/>
-              <a:t>Just iterate through from top left down to bottom right and add the neighbors</a:t>
-            </a:r>
+              <a:t>Just iterate through from top left down to bottom right and add the </a:t>
+            </a:r>
+            <a:r>
+              <a:rPr lang="en-US" sz="2600" dirty="0" smtClean="0"/>
+              <a:t>neighbors</a:t>
+            </a:r>
+          </a:p>
+          <a:p>
+            <a:pPr>
+              <a:buNone/>
+            </a:pPr>
+            <a:endParaRPr lang="en-US" sz="2600" dirty="0" smtClean="0"/>
           </a:p>
           <a:p>
             <a:pPr>
@@ -3825,27 +3843,39 @@
             <p:ph idx="1"/>
           </p:nvPr>
         </p:nvSpPr>
-        <p:spPr/>
-        <p:txBody>
-          <a:bodyPr/>
-          <a:lstStyle/>
-          <a:p>
-            <a:pPr marL="0" indent="0">
+        <p:spPr>
+          <a:xfrm>
+            <a:off x="457200" y="1600200"/>
+            <a:ext cx="3962400" cy="4525963"/>
+          </a:xfrm>
+        </p:spPr>
+        <p:txBody>
+          <a:bodyPr>
+            <a:normAutofit/>
+          </a:bodyPr>
+          <a:lstStyle/>
+          <a:p>
+            <a:pPr marL="347472" indent="-347472">
               <a:buNone/>
             </a:pPr>
             <a:r>
               <a:rPr lang="en-US" dirty="0" smtClean="0"/>
-              <a:t>(insert image of face and integral image of it)</a:t>
+              <a:t>Integral </a:t>
+            </a:r>
+            <a:r>
+              <a:rPr lang="en-US" dirty="0" smtClean="0"/>
+              <a:t>images reduce memory lookups of </a:t>
+            </a:r>
+            <a:r>
+              <a:rPr lang="en-US" dirty="0" smtClean="0"/>
+              <a:t>classifiers</a:t>
             </a:r>
           </a:p>
           <a:p>
             <a:pPr marL="347472" indent="-347472">
               <a:buNone/>
             </a:pPr>
-            <a:r>
-              <a:rPr lang="en-US" dirty="0" smtClean="0"/>
-              <a:t>Integral images reduce memory lookups of classifiers</a:t>
-            </a:r>
+            <a:endParaRPr lang="en-US" dirty="0" smtClean="0"/>
           </a:p>
           <a:p>
             <a:pPr marL="347472" indent="-347472">
@@ -3875,6 +3905,71 @@
           </a:p>
         </p:txBody>
       </p:sp>
+      <p:grpSp>
+        <p:nvGrpSpPr>
+          <p:cNvPr id="6" name="Group 5"/>
+          <p:cNvGrpSpPr/>
+          <p:nvPr/>
+        </p:nvGrpSpPr>
+        <p:grpSpPr>
+          <a:xfrm>
+            <a:off x="5562600" y="1676400"/>
+            <a:ext cx="2590800" cy="4749404"/>
+            <a:chOff x="5334000" y="1496108"/>
+            <a:chExt cx="2743200" cy="5028780"/>
+          </a:xfrm>
+        </p:grpSpPr>
+        <p:pic>
+          <p:nvPicPr>
+            <p:cNvPr id="4" name="Picture 3" descr="screenshot1.png"/>
+            <p:cNvPicPr>
+              <a:picLocks noChangeAspect="1"/>
+            </p:cNvPicPr>
+            <p:nvPr/>
+          </p:nvPicPr>
+          <p:blipFill>
+            <a:blip r:embed="rId2"/>
+            <a:srcRect t="2222" r="51105" b="52222"/>
+            <a:stretch>
+              <a:fillRect/>
+            </a:stretch>
+          </p:blipFill>
+          <p:spPr>
+            <a:xfrm>
+              <a:off x="5334000" y="1496108"/>
+              <a:ext cx="2743200" cy="2542492"/>
+            </a:xfrm>
+            <a:prstGeom prst="rect">
+              <a:avLst/>
+            </a:prstGeom>
+          </p:spPr>
+        </p:pic>
+        <p:pic>
+          <p:nvPicPr>
+            <p:cNvPr id="5" name="Picture 4" descr="screenshot1.png"/>
+            <p:cNvPicPr>
+              <a:picLocks noChangeAspect="1"/>
+            </p:cNvPicPr>
+            <p:nvPr/>
+          </p:nvPicPr>
+          <p:blipFill>
+            <a:blip r:embed="rId2"/>
+            <a:srcRect l="50000" t="2222" b="52222"/>
+            <a:stretch>
+              <a:fillRect/>
+            </a:stretch>
+          </p:blipFill>
+          <p:spPr>
+            <a:xfrm>
+              <a:off x="5334000" y="4038600"/>
+              <a:ext cx="2743200" cy="2486288"/>
+            </a:xfrm>
+            <a:prstGeom prst="rect">
+              <a:avLst/>
+            </a:prstGeom>
+          </p:spPr>
+        </p:pic>
+      </p:grpSp>
     </p:spTree>
   </p:cSld>
   <p:clrMapOvr>
@@ -4089,13 +4184,8 @@
             </a:pPr>
             <a:r>
               <a:rPr lang="en-US" dirty="0" smtClean="0"/>
-              <a:t>Anything left at the end is a </a:t>
-            </a:r>
-            <a:r>
-              <a:rPr lang="en-US" dirty="0" smtClean="0"/>
-              <a:t>face</a:t>
-            </a:r>
-            <a:endParaRPr lang="en-US" dirty="0" smtClean="0"/>
+              <a:t>Anything left at the end is a face</a:t>
+            </a:r>
           </a:p>
         </p:txBody>
       </p:sp>
@@ -5183,17 +5273,18 @@
             </a:pPr>
             <a:r>
               <a:rPr lang="en-US" dirty="0" smtClean="0"/>
-              <a:t>Integral images on GPU vs. CPU</a:t>
+              <a:t>Integral images on GPU vs. </a:t>
+            </a:r>
+            <a:r>
+              <a:rPr lang="en-US" dirty="0" smtClean="0"/>
+              <a:t>CPU</a:t>
             </a:r>
           </a:p>
           <a:p>
             <a:pPr>
               <a:buNone/>
             </a:pPr>
-            <a:r>
-              <a:rPr lang="en-US" dirty="0" smtClean="0"/>
-              <a:t>Occupancy based on scale</a:t>
-            </a:r>
+            <a:endParaRPr lang="en-US" dirty="0" smtClean="0"/>
           </a:p>
           <a:p>
             <a:pPr>
@@ -5201,8 +5292,37 @@
             </a:pPr>
             <a:r>
               <a:rPr lang="en-US" dirty="0" smtClean="0"/>
-              <a:t>Issues with memory coalescing</a:t>
-            </a:r>
+              <a:t>Occupancy based on </a:t>
+            </a:r>
+            <a:r>
+              <a:rPr lang="en-US" dirty="0" smtClean="0"/>
+              <a:t>scale</a:t>
+            </a:r>
+          </a:p>
+          <a:p>
+            <a:pPr>
+              <a:buNone/>
+            </a:pPr>
+            <a:endParaRPr lang="en-US" dirty="0" smtClean="0"/>
+          </a:p>
+          <a:p>
+            <a:pPr>
+              <a:buNone/>
+            </a:pPr>
+            <a:r>
+              <a:rPr lang="en-US" dirty="0" smtClean="0"/>
+              <a:t>Issues with memory </a:t>
+            </a:r>
+            <a:r>
+              <a:rPr lang="en-US" dirty="0" smtClean="0"/>
+              <a:t>coalescing</a:t>
+            </a:r>
+          </a:p>
+          <a:p>
+            <a:pPr>
+              <a:buNone/>
+            </a:pPr>
+            <a:endParaRPr lang="en-US" dirty="0" smtClean="0"/>
           </a:p>
           <a:p>
             <a:pPr>

</xml_diff>

<commit_message>
updated presentation with results and other minor edits
</commit_message>
<xml_diff>
--- a/presentation/Face Detection on the GPU.pptx
+++ b/presentation/Face Detection on the GPU.pptx
@@ -3147,7 +3147,12 @@
             <p:ph type="subTitle" idx="1"/>
           </p:nvPr>
         </p:nvSpPr>
-        <p:spPr/>
+        <p:spPr>
+          <a:xfrm>
+            <a:off x="1371600" y="4724400"/>
+            <a:ext cx="6400800" cy="1752600"/>
+          </a:xfrm>
+        </p:spPr>
         <p:txBody>
           <a:bodyPr/>
           <a:lstStyle/>
@@ -3159,6 +3164,19 @@
             <a:r>
               <a:rPr lang="en-US" dirty="0" err="1" smtClean="0"/>
               <a:t>Straube</a:t>
+            </a:r>
+            <a:endParaRPr lang="en-US" dirty="0" smtClean="0"/>
+          </a:p>
+          <a:p>
+            <a:r>
+              <a:rPr lang="en-US" dirty="0" smtClean="0"/>
+              <a:t>EEC 277 Final Project</a:t>
+            </a:r>
+          </a:p>
+          <a:p>
+            <a:r>
+              <a:rPr lang="en-US" dirty="0" smtClean="0"/>
+              <a:t>University of California, Davis</a:t>
             </a:r>
             <a:endParaRPr lang="en-US" dirty="0"/>
           </a:p>
@@ -3439,6 +3457,13 @@
   <p:clrMapOvr>
     <a:masterClrMapping/>
   </p:clrMapOvr>
+  <p:timing>
+    <p:tnLst>
+      <p:par>
+        <p:cTn id="1" dur="indefinite" restart="never" nodeType="tmRoot"/>
+      </p:par>
+    </p:tnLst>
+  </p:timing>
 </p:sld>
 </file>
 
@@ -3542,6 +3567,13 @@
   <p:clrMapOvr>
     <a:masterClrMapping/>
   </p:clrMapOvr>
+  <p:timing>
+    <p:tnLst>
+      <p:par>
+        <p:cTn id="1" dur="indefinite" restart="never" nodeType="tmRoot"/>
+      </p:par>
+    </p:tnLst>
+  </p:timing>
 </p:sld>
 </file>
 
@@ -3605,8 +3637,18 @@
             </a:pPr>
             <a:r>
               <a:rPr lang="en-US" dirty="0" smtClean="0"/>
-              <a:t>On CPU, cascading removes a ton of work and is a net win</a:t>
-            </a:r>
+              <a:t>On CPU, cascading removes a ton of work and is a net </a:t>
+            </a:r>
+            <a:r>
+              <a:rPr lang="en-US" dirty="0" smtClean="0"/>
+              <a:t>win</a:t>
+            </a:r>
+          </a:p>
+          <a:p>
+            <a:pPr>
+              <a:buNone/>
+            </a:pPr>
+            <a:endParaRPr lang="en-US" dirty="0" smtClean="0"/>
           </a:p>
           <a:p>
             <a:pPr>
@@ -3638,6 +3680,13 @@
   <p:clrMapOvr>
     <a:masterClrMapping/>
   </p:clrMapOvr>
+  <p:timing>
+    <p:tnLst>
+      <p:par>
+        <p:cTn id="1" dur="indefinite" restart="never" nodeType="tmRoot"/>
+      </p:par>
+    </p:tnLst>
+  </p:timing>
 </p:sld>
 </file>
 
@@ -3709,6 +3758,13 @@
   <p:clrMapOvr>
     <a:masterClrMapping/>
   </p:clrMapOvr>
+  <p:timing>
+    <p:tnLst>
+      <p:par>
+        <p:cTn id="1" dur="indefinite" restart="never" nodeType="tmRoot"/>
+      </p:par>
+    </p:tnLst>
+  </p:timing>
 </p:sld>
 </file>
 
@@ -3907,16 +3963,16 @@
       </p:sp>
       <p:grpSp>
         <p:nvGrpSpPr>
-          <p:cNvPr id="6" name="Group 5"/>
+          <p:cNvPr id="7" name="Group 6"/>
           <p:cNvGrpSpPr/>
           <p:nvPr/>
         </p:nvGrpSpPr>
         <p:grpSpPr>
           <a:xfrm>
-            <a:off x="5562600" y="1676400"/>
-            <a:ext cx="2590800" cy="4749404"/>
-            <a:chOff x="5334000" y="1496108"/>
-            <a:chExt cx="2743200" cy="5028780"/>
+            <a:off x="5562600" y="1828800"/>
+            <a:ext cx="2514600" cy="4597004"/>
+            <a:chOff x="5562600" y="1828800"/>
+            <a:chExt cx="2514600" cy="4597004"/>
           </a:xfrm>
         </p:grpSpPr>
         <p:pic>
@@ -3929,15 +3985,15 @@
           </p:nvPicPr>
           <p:blipFill>
             <a:blip r:embed="rId2"/>
-            <a:srcRect t="2222" r="51105" b="52222"/>
+            <a:srcRect t="2222" r="51105" b="52963"/>
             <a:stretch>
               <a:fillRect/>
             </a:stretch>
           </p:blipFill>
           <p:spPr>
             <a:xfrm>
-              <a:off x="5334000" y="1496108"/>
-              <a:ext cx="2743200" cy="2542492"/>
+              <a:off x="5562600" y="1828800"/>
+              <a:ext cx="2507226" cy="2286000"/>
             </a:xfrm>
             <a:prstGeom prst="rect">
               <a:avLst/>
@@ -3954,15 +4010,15 @@
           </p:nvPicPr>
           <p:blipFill>
             <a:blip r:embed="rId2"/>
-            <a:srcRect l="50000" t="2222" b="52222"/>
+            <a:srcRect l="50000" t="2222" r="1471" b="52222"/>
             <a:stretch>
               <a:fillRect/>
             </a:stretch>
           </p:blipFill>
           <p:spPr>
             <a:xfrm>
-              <a:off x="5334000" y="4038600"/>
-              <a:ext cx="2743200" cy="2486288"/>
+              <a:off x="5562600" y="4077643"/>
+              <a:ext cx="2514600" cy="2348161"/>
             </a:xfrm>
             <a:prstGeom prst="rect">
               <a:avLst/>
@@ -5183,19 +5239,111 @@
             <p:ph idx="1"/>
           </p:nvPr>
         </p:nvSpPr>
-        <p:spPr/>
-        <p:txBody>
-          <a:bodyPr/>
-          <a:lstStyle/>
-          <a:p>
-            <a:r>
-              <a:rPr lang="en-US" dirty="0" smtClean="0"/>
-              <a:t>Images of results with minimal text</a:t>
-            </a:r>
-            <a:endParaRPr lang="en-US" dirty="0"/>
-          </a:p>
-        </p:txBody>
-      </p:sp>
+        <p:spPr>
+          <a:xfrm>
+            <a:off x="457200" y="1600200"/>
+            <a:ext cx="8534400" cy="4525963"/>
+          </a:xfrm>
+        </p:spPr>
+        <p:txBody>
+          <a:bodyPr/>
+          <a:lstStyle/>
+          <a:p>
+            <a:pPr>
+              <a:buNone/>
+            </a:pPr>
+            <a:r>
+              <a:rPr lang="en-US" dirty="0" smtClean="0"/>
+              <a:t>Execution times:</a:t>
+            </a:r>
+          </a:p>
+          <a:p>
+            <a:pPr>
+              <a:buNone/>
+            </a:pPr>
+            <a:r>
+              <a:rPr lang="en-US" sz="2600" dirty="0" smtClean="0"/>
+              <a:t>Face detection – 0.20334 s</a:t>
+            </a:r>
+          </a:p>
+          <a:p>
+            <a:pPr>
+              <a:buNone/>
+            </a:pPr>
+            <a:r>
+              <a:rPr lang="en-US" sz="2600" dirty="0" smtClean="0"/>
+              <a:t>Glasses detection (after face detection) – 0.004104 s</a:t>
+            </a:r>
+            <a:endParaRPr lang="en-US" sz="2600" dirty="0" smtClean="0"/>
+          </a:p>
+        </p:txBody>
+      </p:sp>
+      <p:grpSp>
+        <p:nvGrpSpPr>
+          <p:cNvPr id="6" name="Group 5"/>
+          <p:cNvGrpSpPr/>
+          <p:nvPr/>
+        </p:nvGrpSpPr>
+        <p:grpSpPr>
+          <a:xfrm>
+            <a:off x="1095335" y="3276600"/>
+            <a:ext cx="6753265" cy="3200400"/>
+            <a:chOff x="1066800" y="3248484"/>
+            <a:chExt cx="6753265" cy="3200400"/>
+          </a:xfrm>
+        </p:grpSpPr>
+        <p:pic>
+          <p:nvPicPr>
+            <p:cNvPr id="1026" name="Picture 2" descr="C:\Dev\FaceDetect\EEC-277---GPU-Face-Detect\presentation\heatmap.png"/>
+            <p:cNvPicPr>
+              <a:picLocks noChangeAspect="1" noChangeArrowheads="1"/>
+            </p:cNvPicPr>
+            <p:nvPr/>
+          </p:nvPicPr>
+          <p:blipFill>
+            <a:blip r:embed="rId2"/>
+            <a:srcRect/>
+            <a:stretch>
+              <a:fillRect/>
+            </a:stretch>
+          </p:blipFill>
+          <p:spPr bwMode="auto">
+            <a:xfrm>
+              <a:off x="4572000" y="3248484"/>
+              <a:ext cx="3248065" cy="3200400"/>
+            </a:xfrm>
+            <a:prstGeom prst="rect">
+              <a:avLst/>
+            </a:prstGeom>
+            <a:noFill/>
+          </p:spPr>
+        </p:pic>
+        <p:pic>
+          <p:nvPicPr>
+            <p:cNvPr id="5" name="Picture 4" descr="screenshot1.png"/>
+            <p:cNvPicPr>
+              <a:picLocks noChangeAspect="1"/>
+            </p:cNvPicPr>
+            <p:nvPr/>
+          </p:nvPicPr>
+          <p:blipFill>
+            <a:blip r:embed="rId3"/>
+            <a:srcRect t="2222" r="51105" b="52963"/>
+            <a:stretch>
+              <a:fillRect/>
+            </a:stretch>
+          </p:blipFill>
+          <p:spPr>
+            <a:xfrm>
+              <a:off x="1066800" y="3248484"/>
+              <a:ext cx="3510117" cy="3200400"/>
+            </a:xfrm>
+            <a:prstGeom prst="rect">
+              <a:avLst/>
+            </a:prstGeom>
+          </p:spPr>
+        </p:pic>
+      </p:grpSp>
     </p:spTree>
   </p:cSld>
   <p:clrMapOvr>

</xml_diff>